<commit_message>
Moved DemoPlan.doc and diagrams_Sat.. to Final_Submission
</commit_message>
<xml_diff>
--- a/Final_Submission/Team1_May_06_2009_Final_Presentation.pptx
+++ b/Final_Submission/Team1_May_06_2009_Final_Presentation.pptx
@@ -297,7 +297,7 @@
             <a:fld id="{1D8BD707-D9CF-40AE-B4C6-C98DA3205C09}" type="datetimeFigureOut">
               <a:rPr lang="en-US" smtClean="0"/>
               <a:pPr/>
-              <a:t>5/1/2009</a:t>
+              <a:t>5/4/2009</a:t>
             </a:fld>
             <a:endParaRPr lang="en-US"/>
           </a:p>
@@ -464,7 +464,7 @@
             <a:fld id="{1D8BD707-D9CF-40AE-B4C6-C98DA3205C09}" type="datetimeFigureOut">
               <a:rPr lang="en-US" smtClean="0"/>
               <a:pPr/>
-              <a:t>5/1/2009</a:t>
+              <a:t>5/4/2009</a:t>
             </a:fld>
             <a:endParaRPr lang="en-US"/>
           </a:p>
@@ -641,7 +641,7 @@
             <a:fld id="{1D8BD707-D9CF-40AE-B4C6-C98DA3205C09}" type="datetimeFigureOut">
               <a:rPr lang="en-US" smtClean="0"/>
               <a:pPr/>
-              <a:t>5/1/2009</a:t>
+              <a:t>5/4/2009</a:t>
             </a:fld>
             <a:endParaRPr lang="en-US"/>
           </a:p>
@@ -808,7 +808,7 @@
             <a:fld id="{1D8BD707-D9CF-40AE-B4C6-C98DA3205C09}" type="datetimeFigureOut">
               <a:rPr lang="en-US" smtClean="0"/>
               <a:pPr/>
-              <a:t>5/1/2009</a:t>
+              <a:t>5/4/2009</a:t>
             </a:fld>
             <a:endParaRPr lang="en-US"/>
           </a:p>
@@ -1051,7 +1051,7 @@
             <a:fld id="{1D8BD707-D9CF-40AE-B4C6-C98DA3205C09}" type="datetimeFigureOut">
               <a:rPr lang="en-US" smtClean="0"/>
               <a:pPr/>
-              <a:t>5/1/2009</a:t>
+              <a:t>5/4/2009</a:t>
             </a:fld>
             <a:endParaRPr lang="en-US"/>
           </a:p>
@@ -1336,7 +1336,7 @@
             <a:fld id="{1D8BD707-D9CF-40AE-B4C6-C98DA3205C09}" type="datetimeFigureOut">
               <a:rPr lang="en-US" smtClean="0"/>
               <a:pPr/>
-              <a:t>5/1/2009</a:t>
+              <a:t>5/4/2009</a:t>
             </a:fld>
             <a:endParaRPr lang="en-US"/>
           </a:p>
@@ -1755,7 +1755,7 @@
             <a:fld id="{1D8BD707-D9CF-40AE-B4C6-C98DA3205C09}" type="datetimeFigureOut">
               <a:rPr lang="en-US" smtClean="0"/>
               <a:pPr/>
-              <a:t>5/1/2009</a:t>
+              <a:t>5/4/2009</a:t>
             </a:fld>
             <a:endParaRPr lang="en-US"/>
           </a:p>
@@ -1870,7 +1870,7 @@
             <a:fld id="{1D8BD707-D9CF-40AE-B4C6-C98DA3205C09}" type="datetimeFigureOut">
               <a:rPr lang="en-US" smtClean="0"/>
               <a:pPr/>
-              <a:t>5/1/2009</a:t>
+              <a:t>5/4/2009</a:t>
             </a:fld>
             <a:endParaRPr lang="en-US"/>
           </a:p>
@@ -1962,7 +1962,7 @@
             <a:fld id="{1D8BD707-D9CF-40AE-B4C6-C98DA3205C09}" type="datetimeFigureOut">
               <a:rPr lang="en-US" smtClean="0"/>
               <a:pPr/>
-              <a:t>5/1/2009</a:t>
+              <a:t>5/4/2009</a:t>
             </a:fld>
             <a:endParaRPr lang="en-US"/>
           </a:p>
@@ -2236,7 +2236,7 @@
             <a:fld id="{1D8BD707-D9CF-40AE-B4C6-C98DA3205C09}" type="datetimeFigureOut">
               <a:rPr lang="en-US" smtClean="0"/>
               <a:pPr/>
-              <a:t>5/1/2009</a:t>
+              <a:t>5/4/2009</a:t>
             </a:fld>
             <a:endParaRPr lang="en-US"/>
           </a:p>
@@ -2486,7 +2486,7 @@
             <a:fld id="{1D8BD707-D9CF-40AE-B4C6-C98DA3205C09}" type="datetimeFigureOut">
               <a:rPr lang="en-US" smtClean="0"/>
               <a:pPr/>
-              <a:t>5/1/2009</a:t>
+              <a:t>5/4/2009</a:t>
             </a:fld>
             <a:endParaRPr lang="en-US"/>
           </a:p>
@@ -2696,7 +2696,7 @@
             <a:fld id="{1D8BD707-D9CF-40AE-B4C6-C98DA3205C09}" type="datetimeFigureOut">
               <a:rPr lang="en-US" smtClean="0"/>
               <a:pPr/>
-              <a:t>5/1/2009</a:t>
+              <a:t>5/4/2009</a:t>
             </a:fld>
             <a:endParaRPr lang="en-US"/>
           </a:p>
@@ -4440,23 +4440,19 @@
               <a:t>Viva la </a:t>
             </a:r>
             <a:r>
-              <a:rPr lang="en-US" sz="4000" dirty="0" err="1" smtClean="0">
-                <a:latin typeface="Calibri" pitchFamily="34" charset="0"/>
-                <a:cs typeface="Times New Roman" pitchFamily="18" charset="0"/>
-              </a:rPr>
-              <a:t>Collaboracion</a:t>
-            </a:r>
-            <a:r>
               <a:rPr lang="en-US" sz="4000" smtClean="0">
                 <a:latin typeface="Calibri" pitchFamily="34" charset="0"/>
                 <a:cs typeface="Times New Roman" pitchFamily="18" charset="0"/>
               </a:rPr>
+              <a:t>Collaboracíon</a:t>
+            </a:r>
+            <a:r>
+              <a:rPr lang="en-US" sz="4000" dirty="0" smtClean="0">
+                <a:latin typeface="Calibri" pitchFamily="34" charset="0"/>
+                <a:cs typeface="Times New Roman" pitchFamily="18" charset="0"/>
+              </a:rPr>
               <a:t>!</a:t>
             </a:r>
-            <a:endParaRPr lang="en-US" sz="4000" dirty="0" smtClean="0">
-              <a:latin typeface="Calibri" pitchFamily="34" charset="0"/>
-              <a:cs typeface="Times New Roman" pitchFamily="18" charset="0"/>
-            </a:endParaRPr>
           </a:p>
         </p:txBody>
       </p:sp>

</xml_diff>